<commit_message>
Added Bootstrapping info in the BG of the Study
*Bootstrapping isn't dependent on amount of samples
</commit_message>
<xml_diff>
--- a/pptx/ThesisProposal.pptx
+++ b/pptx/ThesisProposal.pptx
@@ -12252,7 +12252,7 @@
         </p:style>
         <p:txBody>
           <a:bodyPr>
-            <a:normAutofit/>
+            <a:normAutofit fontScale="92500" lnSpcReduction="10000"/>
           </a:bodyPr>
           <a:lstStyle/>
           <a:p>
@@ -12295,24 +12295,47 @@
           <a:p>
             <a:pPr algn="just"/>
             <a:r>
+              <a:rPr lang="en-US" dirty="0"/>
+              <a:t>S</a:t>
+            </a:r>
+            <a:r>
+              <a:rPr lang="en-US" dirty="0" smtClean="0"/>
+              <a:t>emi-supervised </a:t>
+            </a:r>
+            <a:r>
+              <a:rPr lang="en-US" dirty="0"/>
+              <a:t>learning on imbalanced classification is rather </a:t>
+            </a:r>
+            <a:r>
+              <a:rPr lang="en-US" dirty="0" smtClean="0"/>
+              <a:t>challenging</a:t>
+            </a:r>
+            <a:r>
+              <a:rPr lang="en-US" dirty="0" smtClean="0"/>
+              <a:t>.</a:t>
+            </a:r>
+          </a:p>
+          <a:p>
+            <a:pPr algn="just"/>
+            <a:r>
+              <a:rPr lang="en-US" dirty="0" smtClean="0"/>
+              <a:t>Bootstrapping is not a sample size dependent resampling schema. </a:t>
+            </a:r>
+            <a:r>
+              <a:rPr lang="en-US" smtClean="0"/>
+              <a:t>Increasing </a:t>
+            </a:r>
+            <a:r>
+              <a:rPr lang="en-US" dirty="0"/>
+              <a:t>the number of samples cannot increase the amount of information in the original data, it can only reduce the effects of random sampling errors which can arise from a bootstrap </a:t>
+            </a:r>
+            <a:r>
               <a:rPr lang="en-US"/>
-              <a:t>S</a:t>
+              <a:t>procedure </a:t>
             </a:r>
             <a:r>
               <a:rPr lang="en-US" smtClean="0"/>
-              <a:t>emi-supervised </a:t>
-            </a:r>
-            <a:r>
-              <a:rPr lang="en-US" dirty="0"/>
-              <a:t>learning on imbalanced classification is </a:t>
-            </a:r>
-            <a:r>
-              <a:rPr lang="en-US"/>
-              <a:t>rather </a:t>
-            </a:r>
-            <a:r>
-              <a:rPr lang="en-US" smtClean="0"/>
-              <a:t>challenging.</a:t>
+              <a:t>itself.</a:t>
             </a:r>
             <a:endParaRPr lang="en-US" dirty="0" smtClean="0"/>
           </a:p>

</xml_diff>

<commit_message>
Added Description on BG of Study
completed the idea on Detection of Harrassment on Web 2.0
</commit_message>
<xml_diff>
--- a/pptx/ThesisProposal.pptx
+++ b/pptx/ThesisProposal.pptx
@@ -125,7 +125,7 @@
   </p:defaultTextStyle>
   <p:extLst>
     <p:ext uri="{EFAFB233-063F-42B5-8137-9DF3F51BA10A}">
-      <p15:sldGuideLst xmlns:p15="http://schemas.microsoft.com/office/powerpoint/2012/main"/>
+      <p15:sldGuideLst xmlns:p15="http://schemas.microsoft.com/office/powerpoint/2012/main" xmlns=""/>
     </p:ext>
   </p:extLst>
 </p:presentation>
@@ -262,7 +262,7 @@
           <a:p>
             <a:fld id="{25EFD301-3C56-434C-B528-DF1DBA052586}" type="datetimeFigureOut">
               <a:rPr lang="en-US" smtClean="0"/>
-              <a:t>10/4/2015</a:t>
+              <a:t>10/5/2015</a:t>
             </a:fld>
             <a:endParaRPr lang="en-US"/>
           </a:p>
@@ -435,7 +435,7 @@
           <a:p>
             <a:fld id="{25EFD301-3C56-434C-B528-DF1DBA052586}" type="datetimeFigureOut">
               <a:rPr lang="en-US" smtClean="0"/>
-              <a:t>10/4/2015</a:t>
+              <a:t>10/5/2015</a:t>
             </a:fld>
             <a:endParaRPr lang="en-US"/>
           </a:p>
@@ -618,7 +618,7 @@
           <a:p>
             <a:fld id="{25EFD301-3C56-434C-B528-DF1DBA052586}" type="datetimeFigureOut">
               <a:rPr lang="en-US" smtClean="0"/>
-              <a:t>10/4/2015</a:t>
+              <a:t>10/5/2015</a:t>
             </a:fld>
             <a:endParaRPr lang="en-US"/>
           </a:p>
@@ -791,7 +791,7 @@
           <a:p>
             <a:fld id="{25EFD301-3C56-434C-B528-DF1DBA052586}" type="datetimeFigureOut">
               <a:rPr lang="en-US" smtClean="0"/>
-              <a:t>10/4/2015</a:t>
+              <a:t>10/5/2015</a:t>
             </a:fld>
             <a:endParaRPr lang="en-US"/>
           </a:p>
@@ -1040,7 +1040,7 @@
           <a:p>
             <a:fld id="{25EFD301-3C56-434C-B528-DF1DBA052586}" type="datetimeFigureOut">
               <a:rPr lang="en-US" smtClean="0"/>
-              <a:t>10/4/2015</a:t>
+              <a:t>10/5/2015</a:t>
             </a:fld>
             <a:endParaRPr lang="en-US"/>
           </a:p>
@@ -1275,7 +1275,7 @@
           <a:p>
             <a:fld id="{25EFD301-3C56-434C-B528-DF1DBA052586}" type="datetimeFigureOut">
               <a:rPr lang="en-US" smtClean="0"/>
-              <a:t>10/4/2015</a:t>
+              <a:t>10/5/2015</a:t>
             </a:fld>
             <a:endParaRPr lang="en-US"/>
           </a:p>
@@ -1645,7 +1645,7 @@
           <a:p>
             <a:fld id="{25EFD301-3C56-434C-B528-DF1DBA052586}" type="datetimeFigureOut">
               <a:rPr lang="en-US" smtClean="0"/>
-              <a:t>10/4/2015</a:t>
+              <a:t>10/5/2015</a:t>
             </a:fld>
             <a:endParaRPr lang="en-US"/>
           </a:p>
@@ -1766,7 +1766,7 @@
           <a:p>
             <a:fld id="{25EFD301-3C56-434C-B528-DF1DBA052586}" type="datetimeFigureOut">
               <a:rPr lang="en-US" smtClean="0"/>
-              <a:t>10/4/2015</a:t>
+              <a:t>10/5/2015</a:t>
             </a:fld>
             <a:endParaRPr lang="en-US"/>
           </a:p>
@@ -1864,7 +1864,7 @@
           <a:p>
             <a:fld id="{25EFD301-3C56-434C-B528-DF1DBA052586}" type="datetimeFigureOut">
               <a:rPr lang="en-US" smtClean="0"/>
-              <a:t>10/4/2015</a:t>
+              <a:t>10/5/2015</a:t>
             </a:fld>
             <a:endParaRPr lang="en-US"/>
           </a:p>
@@ -2144,7 +2144,7 @@
           <a:p>
             <a:fld id="{25EFD301-3C56-434C-B528-DF1DBA052586}" type="datetimeFigureOut">
               <a:rPr lang="en-US" smtClean="0"/>
-              <a:t>10/4/2015</a:t>
+              <a:t>10/5/2015</a:t>
             </a:fld>
             <a:endParaRPr lang="en-US"/>
           </a:p>
@@ -2400,7 +2400,7 @@
           <a:p>
             <a:fld id="{25EFD301-3C56-434C-B528-DF1DBA052586}" type="datetimeFigureOut">
               <a:rPr lang="en-US" smtClean="0"/>
-              <a:t>10/4/2015</a:t>
+              <a:t>10/5/2015</a:t>
             </a:fld>
             <a:endParaRPr lang="en-US"/>
           </a:p>
@@ -2616,7 +2616,7 @@
           <a:p>
             <a:fld id="{25EFD301-3C56-434C-B528-DF1DBA052586}" type="datetimeFigureOut">
               <a:rPr lang="en-US" smtClean="0"/>
-              <a:t>10/4/2015</a:t>
+              <a:t>10/5/2015</a:t>
             </a:fld>
             <a:endParaRPr lang="en-US"/>
           </a:p>
@@ -3188,7 +3188,7 @@
         </p:style>
         <p:txBody>
           <a:bodyPr>
-            <a:normAutofit fontScale="92500"/>
+            <a:normAutofit fontScale="92500" lnSpcReduction="10000"/>
           </a:bodyPr>
           <a:lstStyle/>
           <a:p>
@@ -3215,8 +3215,21 @@
             </a:r>
             <a:r>
               <a:rPr lang="en-US" dirty="0" smtClean="0"/>
-              <a:t>features using Support Vectors. It is somewhat limited based</a:t>
-            </a:r>
+              <a:t>features using Support Vectors. It is somewhat </a:t>
+            </a:r>
+            <a:r>
+              <a:rPr lang="en-US" dirty="0" smtClean="0"/>
+              <a:t>limited due to the bag of words approach does not model </a:t>
+            </a:r>
+            <a:r>
+              <a:rPr lang="en-US" smtClean="0"/>
+              <a:t>the context</a:t>
+            </a:r>
+            <a:r>
+              <a:rPr lang="en-US" dirty="0" smtClean="0"/>
+              <a:t>.</a:t>
+            </a:r>
+            <a:endParaRPr lang="en-US" dirty="0" smtClean="0"/>
           </a:p>
           <a:p>
             <a:pPr algn="just"/>
@@ -10323,7 +10336,7 @@
                         <m:fPr>
                           <m:ctrlPr>
                             <a:rPr lang="en-US" sz="3200" i="1">
-                              <a:latin typeface="Cambria Math" panose="02040503050406030204" pitchFamily="18" charset="0"/>
+                              <a:latin typeface="Cambria Math"/>
                             </a:rPr>
                           </m:ctrlPr>
                         </m:fPr>
@@ -12308,11 +12321,7 @@
             </a:r>
             <a:r>
               <a:rPr lang="en-US" dirty="0" smtClean="0"/>
-              <a:t>challenging</a:t>
-            </a:r>
-            <a:r>
-              <a:rPr lang="en-US" dirty="0" smtClean="0"/>
-              <a:t>.</a:t>
+              <a:t>challenging.</a:t>
             </a:r>
           </a:p>
           <a:p>
@@ -12868,7 +12877,7 @@
   <a:extraClrSchemeLst/>
   <a:extLst>
     <a:ext uri="{05A4C25C-085E-4340-85A3-A5531E510DB2}">
-      <thm15:themeFamily xmlns:thm15="http://schemas.microsoft.com/office/thememl/2012/main" name="Office Theme" id="{62F939B6-93AF-4DB8-9C6B-D6C7DFDC589F}" vid="{4A3C46E8-61CC-4603-A589-7422A47A8E4A}"/>
+      <thm15:themeFamily xmlns:thm15="http://schemas.microsoft.com/office/thememl/2012/main" xmlns="" name="Office Theme" id="{62F939B6-93AF-4DB8-9C6B-D6C7DFDC589F}" vid="{4A3C46E8-61CC-4603-A589-7422A47A8E4A}"/>
     </a:ext>
   </a:extLst>
 </a:theme>

</xml_diff>